<commit_message>
added slides with pros and cons
</commit_message>
<xml_diff>
--- a/Django-Background-Info.pptx
+++ b/Django-Background-Info.pptx
@@ -13,7 +13,8 @@
     <p:sldId id="258" r:id="rId7"/>
     <p:sldId id="262" r:id="rId8"/>
     <p:sldId id="263" r:id="rId9"/>
-    <p:sldId id="264" r:id="rId10"/>
+    <p:sldId id="265" r:id="rId10"/>
+    <p:sldId id="264" r:id="rId11"/>
   </p:sldIdLst>
   <p:sldSz cx="12192000" cy="6858000"/>
   <p:notesSz cx="6858000" cy="9144000"/>
@@ -144,7 +145,7 @@
   <pc:docChgLst>
     <pc:chgData name="Felix Gervasi" userId="af4e32ee5822202e" providerId="LiveId" clId="{23F91ABF-8FCC-4AD7-B1E0-511D60109D4B}"/>
     <pc:docChg chg="undo custSel addSld delSld modSld sldOrd">
-      <pc:chgData name="Felix Gervasi" userId="af4e32ee5822202e" providerId="LiveId" clId="{23F91ABF-8FCC-4AD7-B1E0-511D60109D4B}" dt="2021-11-06T12:42:41.102" v="4354" actId="255"/>
+      <pc:chgData name="Felix Gervasi" userId="af4e32ee5822202e" providerId="LiveId" clId="{23F91ABF-8FCC-4AD7-B1E0-511D60109D4B}" dt="2021-11-11T15:48:53.279" v="4875" actId="20577"/>
       <pc:docMkLst>
         <pc:docMk/>
       </pc:docMkLst>
@@ -376,6 +377,36 @@
           </ac:spMkLst>
         </pc:spChg>
       </pc:sldChg>
+      <pc:sldChg chg="new del">
+        <pc:chgData name="Felix Gervasi" userId="af4e32ee5822202e" providerId="LiveId" clId="{23F91ABF-8FCC-4AD7-B1E0-511D60109D4B}" dt="2021-11-11T11:58:35.817" v="4356" actId="2696"/>
+        <pc:sldMkLst>
+          <pc:docMk/>
+          <pc:sldMk cId="3343317665" sldId="265"/>
+        </pc:sldMkLst>
+      </pc:sldChg>
+      <pc:sldChg chg="modSp add mod">
+        <pc:chgData name="Felix Gervasi" userId="af4e32ee5822202e" providerId="LiveId" clId="{23F91ABF-8FCC-4AD7-B1E0-511D60109D4B}" dt="2021-11-11T15:48:53.279" v="4875" actId="20577"/>
+        <pc:sldMkLst>
+          <pc:docMk/>
+          <pc:sldMk cId="3743722474" sldId="265"/>
+        </pc:sldMkLst>
+        <pc:spChg chg="mod">
+          <ac:chgData name="Felix Gervasi" userId="af4e32ee5822202e" providerId="LiveId" clId="{23F91ABF-8FCC-4AD7-B1E0-511D60109D4B}" dt="2021-11-11T15:15:31.538" v="4500" actId="20577"/>
+          <ac:spMkLst>
+            <pc:docMk/>
+            <pc:sldMk cId="3743722474" sldId="265"/>
+            <ac:spMk id="2" creationId="{11988A48-F07F-43B1-AB23-7BEE6D270A6F}"/>
+          </ac:spMkLst>
+        </pc:spChg>
+        <pc:spChg chg="mod">
+          <ac:chgData name="Felix Gervasi" userId="af4e32ee5822202e" providerId="LiveId" clId="{23F91ABF-8FCC-4AD7-B1E0-511D60109D4B}" dt="2021-11-11T15:48:53.279" v="4875" actId="20577"/>
+          <ac:spMkLst>
+            <pc:docMk/>
+            <pc:sldMk cId="3743722474" sldId="265"/>
+            <ac:spMk id="3" creationId="{8C307441-9458-46D4-B2FD-228E6FCF095E}"/>
+          </ac:spMkLst>
+        </pc:spChg>
+      </pc:sldChg>
     </pc:docChg>
   </pc:docChgLst>
 </pc:chgInfo>
@@ -528,7 +559,7 @@
           <a:p>
             <a:fld id="{0988E117-38F4-442B-8E19-0128E12EAD98}" type="datetimeFigureOut">
               <a:rPr lang="de-DE" smtClean="0"/>
-              <a:t>06.11.2021</a:t>
+              <a:t>11.11.2021</a:t>
             </a:fld>
             <a:endParaRPr lang="de-DE"/>
           </a:p>
@@ -726,7 +757,7 @@
           <a:p>
             <a:fld id="{0988E117-38F4-442B-8E19-0128E12EAD98}" type="datetimeFigureOut">
               <a:rPr lang="de-DE" smtClean="0"/>
-              <a:t>06.11.2021</a:t>
+              <a:t>11.11.2021</a:t>
             </a:fld>
             <a:endParaRPr lang="de-DE"/>
           </a:p>
@@ -934,7 +965,7 @@
           <a:p>
             <a:fld id="{0988E117-38F4-442B-8E19-0128E12EAD98}" type="datetimeFigureOut">
               <a:rPr lang="de-DE" smtClean="0"/>
-              <a:t>06.11.2021</a:t>
+              <a:t>11.11.2021</a:t>
             </a:fld>
             <a:endParaRPr lang="de-DE"/>
           </a:p>
@@ -1132,7 +1163,7 @@
           <a:p>
             <a:fld id="{0988E117-38F4-442B-8E19-0128E12EAD98}" type="datetimeFigureOut">
               <a:rPr lang="de-DE" smtClean="0"/>
-              <a:t>06.11.2021</a:t>
+              <a:t>11.11.2021</a:t>
             </a:fld>
             <a:endParaRPr lang="de-DE"/>
           </a:p>
@@ -1407,7 +1438,7 @@
           <a:p>
             <a:fld id="{0988E117-38F4-442B-8E19-0128E12EAD98}" type="datetimeFigureOut">
               <a:rPr lang="de-DE" smtClean="0"/>
-              <a:t>06.11.2021</a:t>
+              <a:t>11.11.2021</a:t>
             </a:fld>
             <a:endParaRPr lang="de-DE"/>
           </a:p>
@@ -1672,7 +1703,7 @@
           <a:p>
             <a:fld id="{0988E117-38F4-442B-8E19-0128E12EAD98}" type="datetimeFigureOut">
               <a:rPr lang="de-DE" smtClean="0"/>
-              <a:t>06.11.2021</a:t>
+              <a:t>11.11.2021</a:t>
             </a:fld>
             <a:endParaRPr lang="de-DE"/>
           </a:p>
@@ -2084,7 +2115,7 @@
           <a:p>
             <a:fld id="{0988E117-38F4-442B-8E19-0128E12EAD98}" type="datetimeFigureOut">
               <a:rPr lang="de-DE" smtClean="0"/>
-              <a:t>06.11.2021</a:t>
+              <a:t>11.11.2021</a:t>
             </a:fld>
             <a:endParaRPr lang="de-DE"/>
           </a:p>
@@ -2225,7 +2256,7 @@
           <a:p>
             <a:fld id="{0988E117-38F4-442B-8E19-0128E12EAD98}" type="datetimeFigureOut">
               <a:rPr lang="de-DE" smtClean="0"/>
-              <a:t>06.11.2021</a:t>
+              <a:t>11.11.2021</a:t>
             </a:fld>
             <a:endParaRPr lang="de-DE"/>
           </a:p>
@@ -2338,7 +2369,7 @@
           <a:p>
             <a:fld id="{0988E117-38F4-442B-8E19-0128E12EAD98}" type="datetimeFigureOut">
               <a:rPr lang="de-DE" smtClean="0"/>
-              <a:t>06.11.2021</a:t>
+              <a:t>11.11.2021</a:t>
             </a:fld>
             <a:endParaRPr lang="de-DE"/>
           </a:p>
@@ -2649,7 +2680,7 @@
           <a:p>
             <a:fld id="{0988E117-38F4-442B-8E19-0128E12EAD98}" type="datetimeFigureOut">
               <a:rPr lang="de-DE" smtClean="0"/>
-              <a:t>06.11.2021</a:t>
+              <a:t>11.11.2021</a:t>
             </a:fld>
             <a:endParaRPr lang="de-DE"/>
           </a:p>
@@ -2937,7 +2968,7 @@
           <a:p>
             <a:fld id="{0988E117-38F4-442B-8E19-0128E12EAD98}" type="datetimeFigureOut">
               <a:rPr lang="de-DE" smtClean="0"/>
-              <a:t>06.11.2021</a:t>
+              <a:t>11.11.2021</a:t>
             </a:fld>
             <a:endParaRPr lang="de-DE"/>
           </a:p>
@@ -3178,7 +3209,7 @@
           <a:p>
             <a:fld id="{0988E117-38F4-442B-8E19-0128E12EAD98}" type="datetimeFigureOut">
               <a:rPr lang="de-DE" smtClean="0"/>
-              <a:t>06.11.2021</a:t>
+              <a:t>11.11.2021</a:t>
             </a:fld>
             <a:endParaRPr lang="de-DE"/>
           </a:p>
@@ -3680,6 +3711,205 @@
 </p:sld>
 </file>
 
+<file path=ppt/slides/slide10.xml><?xml version="1.0" encoding="utf-8"?>
+<p:sld xmlns:a="http://schemas.openxmlformats.org/drawingml/2006/main" xmlns:r="http://schemas.openxmlformats.org/officeDocument/2006/relationships" xmlns:p="http://schemas.openxmlformats.org/presentationml/2006/main">
+  <p:cSld>
+    <p:bg>
+      <p:bgPr>
+        <a:solidFill>
+          <a:srgbClr val="44B78B"/>
+        </a:solidFill>
+        <a:effectLst/>
+      </p:bgPr>
+    </p:bg>
+    <p:spTree>
+      <p:nvGrpSpPr>
+        <p:cNvPr id="1" name=""/>
+        <p:cNvGrpSpPr/>
+        <p:nvPr/>
+      </p:nvGrpSpPr>
+      <p:grpSpPr>
+        <a:xfrm>
+          <a:off x="0" y="0"/>
+          <a:ext cx="0" cy="0"/>
+          <a:chOff x="0" y="0"/>
+          <a:chExt cx="0" cy="0"/>
+        </a:xfrm>
+      </p:grpSpPr>
+      <p:sp>
+        <p:nvSpPr>
+          <p:cNvPr id="2" name="Titel 1">
+            <a:extLst>
+              <a:ext uri="{FF2B5EF4-FFF2-40B4-BE49-F238E27FC236}">
+                <a16:creationId xmlns:a16="http://schemas.microsoft.com/office/drawing/2014/main" id="{11988A48-F07F-43B1-AB23-7BEE6D270A6F}"/>
+              </a:ext>
+            </a:extLst>
+          </p:cNvPr>
+          <p:cNvSpPr>
+            <a:spLocks noGrp="1"/>
+          </p:cNvSpPr>
+          <p:nvPr>
+            <p:ph type="title"/>
+          </p:nvPr>
+        </p:nvSpPr>
+        <p:spPr/>
+        <p:txBody>
+          <a:bodyPr/>
+          <a:lstStyle/>
+          <a:p>
+            <a:r>
+              <a:rPr lang="en-US" b="1" dirty="0">
+                <a:solidFill>
+                  <a:schemeClr val="bg1"/>
+                </a:solidFill>
+              </a:rPr>
+              <a:t>Recap</a:t>
+            </a:r>
+          </a:p>
+        </p:txBody>
+      </p:sp>
+      <p:sp>
+        <p:nvSpPr>
+          <p:cNvPr id="3" name="Inhaltsplatzhalter 2">
+            <a:extLst>
+              <a:ext uri="{FF2B5EF4-FFF2-40B4-BE49-F238E27FC236}">
+                <a16:creationId xmlns:a16="http://schemas.microsoft.com/office/drawing/2014/main" id="{8C307441-9458-46D4-B2FD-228E6FCF095E}"/>
+              </a:ext>
+            </a:extLst>
+          </p:cNvPr>
+          <p:cNvSpPr>
+            <a:spLocks noGrp="1"/>
+          </p:cNvSpPr>
+          <p:nvPr>
+            <p:ph idx="1"/>
+          </p:nvPr>
+        </p:nvSpPr>
+        <p:spPr/>
+        <p:txBody>
+          <a:bodyPr/>
+          <a:lstStyle/>
+          <a:p>
+            <a:pPr lvl="1"/>
+            <a:r>
+              <a:rPr lang="en-US" dirty="0">
+                <a:solidFill>
+                  <a:schemeClr val="bg1"/>
+                </a:solidFill>
+              </a:rPr>
+              <a:t>Basic explanation of Django</a:t>
+            </a:r>
+          </a:p>
+          <a:p>
+            <a:pPr lvl="1"/>
+            <a:r>
+              <a:rPr lang="en-US" dirty="0">
+                <a:solidFill>
+                  <a:schemeClr val="bg1"/>
+                </a:solidFill>
+              </a:rPr>
+              <a:t>Installation of Django</a:t>
+            </a:r>
+          </a:p>
+          <a:p>
+            <a:pPr lvl="1"/>
+            <a:r>
+              <a:rPr lang="en-US" dirty="0">
+                <a:solidFill>
+                  <a:schemeClr val="bg1"/>
+                </a:solidFill>
+              </a:rPr>
+              <a:t>Running the development server</a:t>
+            </a:r>
+          </a:p>
+          <a:p>
+            <a:pPr lvl="1"/>
+            <a:r>
+              <a:rPr lang="en-US" dirty="0">
+                <a:solidFill>
+                  <a:schemeClr val="bg1"/>
+                </a:solidFill>
+              </a:rPr>
+              <a:t>Starting a project and creating an app</a:t>
+            </a:r>
+          </a:p>
+          <a:p>
+            <a:pPr lvl="1"/>
+            <a:r>
+              <a:rPr lang="en-US" dirty="0">
+                <a:solidFill>
+                  <a:schemeClr val="bg1"/>
+                </a:solidFill>
+              </a:rPr>
+              <a:t>Basic explanation of MVC</a:t>
+            </a:r>
+          </a:p>
+          <a:p>
+            <a:pPr lvl="1"/>
+            <a:r>
+              <a:rPr lang="en-US" dirty="0">
+                <a:solidFill>
+                  <a:schemeClr val="bg1"/>
+                </a:solidFill>
+              </a:rPr>
+              <a:t>Creating views and templates</a:t>
+            </a:r>
+          </a:p>
+          <a:p>
+            <a:pPr lvl="1"/>
+            <a:r>
+              <a:rPr lang="en-US" dirty="0">
+                <a:solidFill>
+                  <a:schemeClr val="bg1"/>
+                </a:solidFill>
+              </a:rPr>
+              <a:t>Using database models</a:t>
+            </a:r>
+          </a:p>
+          <a:p>
+            <a:pPr lvl="1"/>
+            <a:r>
+              <a:rPr lang="en-US" dirty="0">
+                <a:solidFill>
+                  <a:schemeClr val="bg1"/>
+                </a:solidFill>
+              </a:rPr>
+              <a:t>Managing data as an admin</a:t>
+            </a:r>
+          </a:p>
+          <a:p>
+            <a:pPr lvl="1"/>
+            <a:r>
+              <a:rPr lang="en-US" dirty="0">
+                <a:solidFill>
+                  <a:schemeClr val="bg1"/>
+                </a:solidFill>
+              </a:rPr>
+              <a:t>Creating a basic task tracker app</a:t>
+            </a:r>
+          </a:p>
+          <a:p>
+            <a:pPr lvl="1"/>
+            <a:endParaRPr lang="en-US" dirty="0">
+              <a:solidFill>
+                <a:schemeClr val="bg1"/>
+              </a:solidFill>
+            </a:endParaRPr>
+          </a:p>
+        </p:txBody>
+      </p:sp>
+    </p:spTree>
+    <p:extLst>
+      <p:ext uri="{BB962C8B-B14F-4D97-AF65-F5344CB8AC3E}">
+        <p14:creationId xmlns:p14="http://schemas.microsoft.com/office/powerpoint/2010/main" val="1032012952"/>
+      </p:ext>
+    </p:extLst>
+  </p:cSld>
+  <p:clrMapOvr>
+    <a:masterClrMapping/>
+  </p:clrMapOvr>
+</p:sld>
+</file>
+
 <file path=ppt/slides/slide2.xml><?xml version="1.0" encoding="utf-8"?>
 <p:sld xmlns:a="http://schemas.openxmlformats.org/drawingml/2006/main" xmlns:r="http://schemas.openxmlformats.org/officeDocument/2006/relationships" xmlns:p="http://schemas.openxmlformats.org/presentationml/2006/main">
   <p:cSld>
@@ -5562,7 +5792,7 @@
                   <a:schemeClr val="bg1"/>
                 </a:solidFill>
               </a:rPr>
-              <a:t>Recap</a:t>
+              <a:t>Pros and Cons of Django</a:t>
             </a:r>
           </a:p>
         </p:txBody>
@@ -5595,7 +5825,51 @@
                   <a:schemeClr val="bg1"/>
                 </a:solidFill>
               </a:rPr>
-              <a:t>Basic explanation of Django</a:t>
+              <a:t>Pros</a:t>
+            </a:r>
+          </a:p>
+          <a:p>
+            <a:pPr lvl="2"/>
+            <a:r>
+              <a:rPr lang="en-US" dirty="0">
+                <a:solidFill>
+                  <a:schemeClr val="bg1"/>
+                </a:solidFill>
+              </a:rPr>
+              <a:t>Django is a “High Level” framework i.e., it offers a lot of inbuilt tools and utilities e.g., admin panel, user authentication or testing-libraries</a:t>
+            </a:r>
+          </a:p>
+          <a:p>
+            <a:pPr lvl="2"/>
+            <a:r>
+              <a:rPr lang="en-US" dirty="0">
+                <a:solidFill>
+                  <a:schemeClr val="bg1"/>
+                </a:solidFill>
+              </a:rPr>
+              <a:t>Scalability - Django is built to handle millions of users</a:t>
+            </a:r>
+          </a:p>
+          <a:p>
+            <a:pPr lvl="2"/>
+            <a:r>
+              <a:rPr lang="en-US" dirty="0">
+                <a:solidFill>
+                  <a:schemeClr val="bg1"/>
+                </a:solidFill>
+              </a:rPr>
+              <a:t>Clearly structured (MVC)</a:t>
+            </a:r>
+          </a:p>
+          <a:p>
+            <a:pPr lvl="2"/>
+            <a:r>
+              <a:rPr lang="en-US" dirty="0">
+                <a:solidFill>
+                  <a:schemeClr val="bg1"/>
+                </a:solidFill>
+              </a:rPr>
+              <a:t>Less code because of reusable apps</a:t>
             </a:r>
           </a:p>
           <a:p>
@@ -5606,88 +5880,33 @@
                   <a:schemeClr val="bg1"/>
                 </a:solidFill>
               </a:rPr>
-              <a:t>Installation of Django</a:t>
-            </a:r>
-          </a:p>
-          <a:p>
-            <a:pPr lvl="1"/>
+              <a:t>Cons</a:t>
+            </a:r>
+          </a:p>
+          <a:p>
+            <a:pPr lvl="2"/>
             <a:r>
               <a:rPr lang="en-US" dirty="0">
                 <a:solidFill>
                   <a:schemeClr val="bg1"/>
                 </a:solidFill>
               </a:rPr>
-              <a:t>Running the development server</a:t>
-            </a:r>
-          </a:p>
-          <a:p>
-            <a:pPr lvl="1"/>
+              <a:t>Django is known for taking up a lot of resources (less suited for small projects)</a:t>
+            </a:r>
+          </a:p>
+          <a:p>
+            <a:pPr lvl="2"/>
             <a:r>
               <a:rPr lang="en-US" dirty="0">
                 <a:solidFill>
                   <a:schemeClr val="bg1"/>
                 </a:solidFill>
               </a:rPr>
-              <a:t>Starting a project and creating an app</a:t>
-            </a:r>
-          </a:p>
-          <a:p>
-            <a:pPr lvl="1"/>
-            <a:r>
-              <a:rPr lang="en-US" dirty="0">
-                <a:solidFill>
-                  <a:schemeClr val="bg1"/>
-                </a:solidFill>
-              </a:rPr>
-              <a:t>Basic explanation of MVC</a:t>
-            </a:r>
-          </a:p>
-          <a:p>
-            <a:pPr lvl="1"/>
-            <a:r>
-              <a:rPr lang="en-US" dirty="0">
-                <a:solidFill>
-                  <a:schemeClr val="bg1"/>
-                </a:solidFill>
-              </a:rPr>
-              <a:t>Creating views and templates</a:t>
-            </a:r>
-          </a:p>
-          <a:p>
-            <a:pPr lvl="1"/>
-            <a:r>
-              <a:rPr lang="en-US" dirty="0">
-                <a:solidFill>
-                  <a:schemeClr val="bg1"/>
-                </a:solidFill>
-              </a:rPr>
-              <a:t>Using database models</a:t>
-            </a:r>
-          </a:p>
-          <a:p>
-            <a:pPr lvl="1"/>
-            <a:r>
-              <a:rPr lang="en-US" dirty="0">
-                <a:solidFill>
-                  <a:schemeClr val="bg1"/>
-                </a:solidFill>
-              </a:rPr>
-              <a:t>Managing data as an admin</a:t>
-            </a:r>
-          </a:p>
-          <a:p>
-            <a:pPr lvl="1"/>
-            <a:r>
-              <a:rPr lang="en-US" dirty="0">
-                <a:solidFill>
-                  <a:schemeClr val="bg1"/>
-                </a:solidFill>
-              </a:rPr>
-              <a:t>Creating a basic task tracker app</a:t>
-            </a:r>
-          </a:p>
-          <a:p>
-            <a:pPr lvl="1"/>
+              <a:t>Slower compared to other backend frameworks</a:t>
+            </a:r>
+          </a:p>
+          <a:p>
+            <a:pPr lvl="2"/>
             <a:endParaRPr lang="en-US" dirty="0">
               <a:solidFill>
                 <a:schemeClr val="bg1"/>
@@ -5699,7 +5918,7 @@
     </p:spTree>
     <p:extLst>
       <p:ext uri="{BB962C8B-B14F-4D97-AF65-F5344CB8AC3E}">
-        <p14:creationId xmlns:p14="http://schemas.microsoft.com/office/powerpoint/2010/main" val="1032012952"/>
+        <p14:creationId xmlns:p14="http://schemas.microsoft.com/office/powerpoint/2010/main" val="3743722474"/>
       </p:ext>
     </p:extLst>
   </p:cSld>

</xml_diff>